<commit_message>
little change on display
</commit_message>
<xml_diff>
--- a/Calibration/autoCali/documents/HELIOS AutoCalibration.pptx
+++ b/Calibration/autoCali/documents/HELIOS AutoCalibration.pptx
@@ -17,6 +17,7 @@
     <p:sldId id="262" r:id="rId11"/>
     <p:sldId id="264" r:id="rId12"/>
     <p:sldId id="267" r:id="rId13"/>
+    <p:sldId id="268" r:id="rId14"/>
   </p:sldIdLst>
   <p:sldSz cx="12192000" cy="6858000"/>
   <p:notesSz cx="6858000" cy="9144000"/>
@@ -115,6 +116,11 @@
       </a:defRPr>
     </a:lvl9pPr>
   </p:defaultTextStyle>
+  <p:extLst>
+    <p:ext uri="{EFAFB233-063F-42B5-8137-9DF3F51BA10A}">
+      <p15:sldGuideLst xmlns:p15="http://schemas.microsoft.com/office/powerpoint/2012/main"/>
+    </p:ext>
+  </p:extLst>
 </p:presentation>
 </file>
 
@@ -265,7 +271,7 @@
           <a:p>
             <a:fld id="{37811E72-3072-7447-A431-2B09A46B4DDB}" type="datetimeFigureOut">
               <a:rPr lang="en-US" smtClean="0"/>
-              <a:t>7/12/18</a:t>
+              <a:t>7/14/18</a:t>
             </a:fld>
             <a:endParaRPr lang="en-US"/>
           </a:p>
@@ -463,7 +469,7 @@
           <a:p>
             <a:fld id="{37811E72-3072-7447-A431-2B09A46B4DDB}" type="datetimeFigureOut">
               <a:rPr lang="en-US" smtClean="0"/>
-              <a:t>7/12/18</a:t>
+              <a:t>7/14/18</a:t>
             </a:fld>
             <a:endParaRPr lang="en-US"/>
           </a:p>
@@ -671,7 +677,7 @@
           <a:p>
             <a:fld id="{37811E72-3072-7447-A431-2B09A46B4DDB}" type="datetimeFigureOut">
               <a:rPr lang="en-US" smtClean="0"/>
-              <a:t>7/12/18</a:t>
+              <a:t>7/14/18</a:t>
             </a:fld>
             <a:endParaRPr lang="en-US"/>
           </a:p>
@@ -869,7 +875,7 @@
           <a:p>
             <a:fld id="{37811E72-3072-7447-A431-2B09A46B4DDB}" type="datetimeFigureOut">
               <a:rPr lang="en-US" smtClean="0"/>
-              <a:t>7/12/18</a:t>
+              <a:t>7/14/18</a:t>
             </a:fld>
             <a:endParaRPr lang="en-US"/>
           </a:p>
@@ -1144,7 +1150,7 @@
           <a:p>
             <a:fld id="{37811E72-3072-7447-A431-2B09A46B4DDB}" type="datetimeFigureOut">
               <a:rPr lang="en-US" smtClean="0"/>
-              <a:t>7/12/18</a:t>
+              <a:t>7/14/18</a:t>
             </a:fld>
             <a:endParaRPr lang="en-US"/>
           </a:p>
@@ -1409,7 +1415,7 @@
           <a:p>
             <a:fld id="{37811E72-3072-7447-A431-2B09A46B4DDB}" type="datetimeFigureOut">
               <a:rPr lang="en-US" smtClean="0"/>
-              <a:t>7/12/18</a:t>
+              <a:t>7/14/18</a:t>
             </a:fld>
             <a:endParaRPr lang="en-US"/>
           </a:p>
@@ -1821,7 +1827,7 @@
           <a:p>
             <a:fld id="{37811E72-3072-7447-A431-2B09A46B4DDB}" type="datetimeFigureOut">
               <a:rPr lang="en-US" smtClean="0"/>
-              <a:t>7/12/18</a:t>
+              <a:t>7/14/18</a:t>
             </a:fld>
             <a:endParaRPr lang="en-US"/>
           </a:p>
@@ -1962,7 +1968,7 @@
           <a:p>
             <a:fld id="{37811E72-3072-7447-A431-2B09A46B4DDB}" type="datetimeFigureOut">
               <a:rPr lang="en-US" smtClean="0"/>
-              <a:t>7/12/18</a:t>
+              <a:t>7/14/18</a:t>
             </a:fld>
             <a:endParaRPr lang="en-US"/>
           </a:p>
@@ -2075,7 +2081,7 @@
           <a:p>
             <a:fld id="{37811E72-3072-7447-A431-2B09A46B4DDB}" type="datetimeFigureOut">
               <a:rPr lang="en-US" smtClean="0"/>
-              <a:t>7/12/18</a:t>
+              <a:t>7/14/18</a:t>
             </a:fld>
             <a:endParaRPr lang="en-US"/>
           </a:p>
@@ -2386,7 +2392,7 @@
           <a:p>
             <a:fld id="{37811E72-3072-7447-A431-2B09A46B4DDB}" type="datetimeFigureOut">
               <a:rPr lang="en-US" smtClean="0"/>
-              <a:t>7/12/18</a:t>
+              <a:t>7/14/18</a:t>
             </a:fld>
             <a:endParaRPr lang="en-US"/>
           </a:p>
@@ -2674,7 +2680,7 @@
           <a:p>
             <a:fld id="{37811E72-3072-7447-A431-2B09A46B4DDB}" type="datetimeFigureOut">
               <a:rPr lang="en-US" smtClean="0"/>
-              <a:t>7/12/18</a:t>
+              <a:t>7/14/18</a:t>
             </a:fld>
             <a:endParaRPr lang="en-US"/>
           </a:p>
@@ -2915,7 +2921,7 @@
           <a:p>
             <a:fld id="{37811E72-3072-7447-A431-2B09A46B4DDB}" type="datetimeFigureOut">
               <a:rPr lang="en-US" smtClean="0"/>
-              <a:t>7/12/18</a:t>
+              <a:t>7/14/18</a:t>
             </a:fld>
             <a:endParaRPr lang="en-US"/>
           </a:p>
@@ -3444,12 +3450,12 @@
         <p:spPr>
           <a:xfrm>
             <a:off x="838200" y="1825625"/>
-            <a:ext cx="7669192" cy="1716228"/>
+            <a:ext cx="6989618" cy="1716228"/>
           </a:xfrm>
         </p:spPr>
         <p:txBody>
           <a:bodyPr>
-            <a:normAutofit lnSpcReduction="10000"/>
+            <a:normAutofit fontScale="92500" lnSpcReduction="20000"/>
           </a:bodyPr>
           <a:lstStyle/>
           <a:p>
@@ -3559,7 +3565,7 @@
         <p:spPr>
           <a:xfrm>
             <a:off x="838200" y="4698075"/>
-            <a:ext cx="10515600" cy="1716228"/>
+            <a:ext cx="6393873" cy="1716228"/>
           </a:xfrm>
           <a:prstGeom prst="rect">
             <a:avLst/>
@@ -3739,6 +3745,26 @@
               <a:t>Larger resolution</a:t>
             </a:r>
           </a:p>
+          <a:p>
+            <a:r>
+              <a:rPr lang="en-US" dirty="0"/>
+              <a:t>At least 2 levels is needed.</a:t>
+            </a:r>
+          </a:p>
+          <a:p>
+            <a:r>
+              <a:rPr lang="en-US" dirty="0"/>
+              <a:t>The range of (</a:t>
+            </a:r>
+            <a:r>
+              <a:rPr lang="en-US" dirty="0" err="1"/>
+              <a:t>a,b</a:t>
+            </a:r>
+            <a:r>
+              <a:rPr lang="en-US" dirty="0"/>
+              <a:t>) can be difficult to find.</a:t>
+            </a:r>
+          </a:p>
         </p:txBody>
       </p:sp>
       <p:pic>
@@ -3766,8 +3792,8 @@
         </p:blipFill>
         <p:spPr bwMode="auto">
           <a:xfrm>
-            <a:off x="8753174" y="640901"/>
-            <a:ext cx="3019425" cy="3259455"/>
+            <a:off x="7438310" y="1133570"/>
+            <a:ext cx="4304999" cy="4647226"/>
           </a:xfrm>
           <a:prstGeom prst="rect">
             <a:avLst/>
@@ -3782,6 +3808,129 @@
           </a:extLst>
         </p:spPr>
       </p:pic>
+      <p:sp>
+        <p:nvSpPr>
+          <p:cNvPr id="7" name="TextBox 6">
+            <a:extLst>
+              <a:ext uri="{FF2B5EF4-FFF2-40B4-BE49-F238E27FC236}">
+                <a16:creationId xmlns:a16="http://schemas.microsoft.com/office/drawing/2014/main" id="{3C582E8D-62E2-FD4B-84CE-678FD5A884B1}"/>
+              </a:ext>
+            </a:extLst>
+          </p:cNvPr>
+          <p:cNvSpPr txBox="1"/>
+          <p:nvPr/>
+        </p:nvSpPr>
+        <p:spPr>
+          <a:xfrm>
+            <a:off x="8769687" y="3773859"/>
+            <a:ext cx="821122" cy="369332"/>
+          </a:xfrm>
+          <a:prstGeom prst="rect">
+            <a:avLst/>
+          </a:prstGeom>
+          <a:noFill/>
+        </p:spPr>
+        <p:txBody>
+          <a:bodyPr wrap="none" rtlCol="0">
+            <a:spAutoFit/>
+          </a:bodyPr>
+          <a:lstStyle/>
+          <a:p>
+            <a:r>
+              <a:rPr lang="en-US" dirty="0"/>
+              <a:t>Folded</a:t>
+            </a:r>
+          </a:p>
+        </p:txBody>
+      </p:sp>
+      <p:cxnSp>
+        <p:nvCxnSpPr>
+          <p:cNvPr id="9" name="Straight Arrow Connector 8">
+            <a:extLst>
+              <a:ext uri="{FF2B5EF4-FFF2-40B4-BE49-F238E27FC236}">
+                <a16:creationId xmlns:a16="http://schemas.microsoft.com/office/drawing/2014/main" id="{D3257561-3848-B14C-8F61-A89E9778B800}"/>
+              </a:ext>
+            </a:extLst>
+          </p:cNvPr>
+          <p:cNvCxnSpPr>
+            <a:stCxn id="7" idx="2"/>
+          </p:cNvCxnSpPr>
+          <p:nvPr/>
+        </p:nvCxnSpPr>
+        <p:spPr>
+          <a:xfrm flipH="1">
+            <a:off x="8589818" y="4143191"/>
+            <a:ext cx="590430" cy="387245"/>
+          </a:xfrm>
+          <a:prstGeom prst="straightConnector1">
+            <a:avLst/>
+          </a:prstGeom>
+          <a:ln w="38100">
+            <a:solidFill>
+              <a:schemeClr val="tx1"/>
+            </a:solidFill>
+            <a:tailEnd type="triangle"/>
+          </a:ln>
+        </p:spPr>
+        <p:style>
+          <a:lnRef idx="1">
+            <a:schemeClr val="accent1"/>
+          </a:lnRef>
+          <a:fillRef idx="0">
+            <a:schemeClr val="accent1"/>
+          </a:fillRef>
+          <a:effectRef idx="0">
+            <a:schemeClr val="accent1"/>
+          </a:effectRef>
+          <a:fontRef idx="minor">
+            <a:schemeClr val="tx1"/>
+          </a:fontRef>
+        </p:style>
+      </p:cxnSp>
+      <p:cxnSp>
+        <p:nvCxnSpPr>
+          <p:cNvPr id="10" name="Straight Arrow Connector 9">
+            <a:extLst>
+              <a:ext uri="{FF2B5EF4-FFF2-40B4-BE49-F238E27FC236}">
+                <a16:creationId xmlns:a16="http://schemas.microsoft.com/office/drawing/2014/main" id="{09DDCFF3-1FE3-714B-997C-567FF9BB73B1}"/>
+              </a:ext>
+            </a:extLst>
+          </p:cNvPr>
+          <p:cNvCxnSpPr>
+            <a:cxnSpLocks/>
+          </p:cNvCxnSpPr>
+          <p:nvPr/>
+        </p:nvCxnSpPr>
+        <p:spPr>
+          <a:xfrm>
+            <a:off x="9180248" y="4143191"/>
+            <a:ext cx="662480" cy="545956"/>
+          </a:xfrm>
+          <a:prstGeom prst="straightConnector1">
+            <a:avLst/>
+          </a:prstGeom>
+          <a:ln w="38100">
+            <a:solidFill>
+              <a:schemeClr val="tx1"/>
+            </a:solidFill>
+            <a:tailEnd type="triangle"/>
+          </a:ln>
+        </p:spPr>
+        <p:style>
+          <a:lnRef idx="1">
+            <a:schemeClr val="accent1"/>
+          </a:lnRef>
+          <a:fillRef idx="0">
+            <a:schemeClr val="accent1"/>
+          </a:fillRef>
+          <a:effectRef idx="0">
+            <a:schemeClr val="accent1"/>
+          </a:effectRef>
+          <a:fontRef idx="minor">
+            <a:schemeClr val="tx1"/>
+          </a:fontRef>
+        </p:style>
+      </p:cxnSp>
     </p:spTree>
     <p:extLst>
       <p:ext uri="{BB962C8B-B14F-4D97-AF65-F5344CB8AC3E}">
@@ -3863,12 +4012,6 @@
           <a:p>
             <a:r>
               <a:rPr lang="en-US" dirty="0"/>
-              <a:t>Better searching algorithm</a:t>
-            </a:r>
-          </a:p>
-          <a:p>
-            <a:r>
-              <a:rPr lang="en-US" dirty="0"/>
               <a:t>Find a method to fit same-</a:t>
             </a:r>
             <a:r>
@@ -3884,13 +4027,64 @@
             <a:pPr lvl="1"/>
             <a:r>
               <a:rPr lang="en-US" dirty="0"/>
-              <a:t>So that the scaling factor is the same</a:t>
-            </a:r>
-          </a:p>
-          <a:p>
+              <a:t>So that the scaling factor is the same , 1+4-dim search, #trial ~ 3 order more </a:t>
+            </a:r>
+          </a:p>
+          <a:p>
+            <a:pPr marL="457200" lvl="1" indent="0">
+              <a:buNone/>
+            </a:pPr>
+            <a:r>
+              <a:rPr lang="en-US" dirty="0">
+                <a:sym typeface="Wingdings" pitchFamily="2" charset="2"/>
+              </a:rPr>
+              <a:t></a:t>
+            </a:r>
             <a:r>
               <a:rPr lang="en-US" dirty="0"/>
-              <a:t>A easy mapping from (</a:t>
+              <a:t> improve resolution</a:t>
+            </a:r>
+          </a:p>
+          <a:p>
+            <a:r>
+              <a:rPr lang="en-US" dirty="0"/>
+              <a:t>Better searching algorithm (machine learning?)</a:t>
+            </a:r>
+          </a:p>
+          <a:p>
+            <a:pPr marL="457200" lvl="1" indent="0">
+              <a:buNone/>
+            </a:pPr>
+            <a:r>
+              <a:rPr lang="en-US" dirty="0">
+                <a:sym typeface="Wingdings" pitchFamily="2" charset="2"/>
+              </a:rPr>
+              <a:t> faster</a:t>
+            </a:r>
+            <a:endParaRPr lang="en-US" dirty="0"/>
+          </a:p>
+          <a:p>
+            <a:r>
+              <a:rPr lang="en-US" dirty="0"/>
+              <a:t>Will the fit is better if simulation has no energy loss? </a:t>
+            </a:r>
+          </a:p>
+          <a:p>
+            <a:pPr marL="457200" lvl="1" indent="0">
+              <a:buNone/>
+            </a:pPr>
+            <a:r>
+              <a:rPr lang="en-US" dirty="0">
+                <a:sym typeface="Wingdings" pitchFamily="2" charset="2"/>
+              </a:rPr>
+              <a:t> improve accuracy</a:t>
+            </a:r>
+            <a:endParaRPr lang="en-US" dirty="0"/>
+          </a:p>
+          <a:p>
+            <a:r>
+              <a:rPr lang="en-US" dirty="0"/>
+              <a:t>A better mapping from (</a:t>
             </a:r>
             <a:r>
               <a:rPr lang="en-US" dirty="0" err="1"/>
@@ -3906,10 +4100,31 @@
             </a:r>
             <a:r>
               <a:rPr lang="en-US" dirty="0"/>
-              <a:t>)?</a:t>
-            </a:r>
-          </a:p>
-          <a:p>
+              <a:t>)? </a:t>
+            </a:r>
+          </a:p>
+          <a:p>
+            <a:pPr marL="457200" lvl="1" indent="0">
+              <a:buNone/>
+            </a:pPr>
+            <a:r>
+              <a:rPr lang="en-US" dirty="0">
+                <a:sym typeface="Wingdings" pitchFamily="2" charset="2"/>
+              </a:rPr>
+              <a:t> push the </a:t>
+            </a:r>
+            <a:r>
+              <a:rPr lang="en-US" dirty="0" err="1">
+                <a:sym typeface="Wingdings" pitchFamily="2" charset="2"/>
+              </a:rPr>
+              <a:t>thetaCM</a:t>
+            </a:r>
+            <a:r>
+              <a:rPr lang="en-US" dirty="0">
+                <a:sym typeface="Wingdings" pitchFamily="2" charset="2"/>
+              </a:rPr>
+              <a:t> to 0 degree?</a:t>
+            </a:r>
             <a:endParaRPr lang="en-US" dirty="0"/>
           </a:p>
         </p:txBody>
@@ -3960,7 +4175,12 @@
             <p:ph type="title"/>
           </p:nvPr>
         </p:nvSpPr>
-        <p:spPr/>
+        <p:spPr>
+          <a:xfrm>
+            <a:off x="485789" y="253509"/>
+            <a:ext cx="10515600" cy="1325563"/>
+          </a:xfrm>
+        </p:spPr>
         <p:txBody>
           <a:bodyPr/>
           <a:lstStyle/>
@@ -4004,7 +4224,7 @@
             </p:nvSpPr>
             <p:spPr>
               <a:xfrm>
-                <a:off x="466846" y="1690688"/>
+                <a:off x="466846" y="1662933"/>
                 <a:ext cx="7276618" cy="984052"/>
               </a:xfrm>
               <a:prstGeom prst="rect">
@@ -4017,6 +4237,7 @@
               </a:bodyPr>
               <a:lstStyle/>
               <a:p>
+                <a:pPr/>
                 <a14:m>
                   <m:oMathPara xmlns:m="http://schemas.openxmlformats.org/officeDocument/2006/math">
                     <m:oMathParaPr>
@@ -4424,7 +4645,7 @@
             </p:nvSpPr>
             <p:spPr>
               <a:xfrm>
-                <a:off x="466846" y="1690688"/>
+                <a:off x="466846" y="1662933"/>
                 <a:ext cx="7276618" cy="984052"/>
               </a:xfrm>
               <a:prstGeom prst="rect">
@@ -4452,8 +4673,8 @@
           </p:sp>
         </mc:Fallback>
       </mc:AlternateContent>
-      <mc:AlternateContent xmlns:mc="http://schemas.openxmlformats.org/markup-compatibility/2006">
-        <mc:Choice xmlns:a14="http://schemas.microsoft.com/office/drawing/2010/main" Requires="a14">
+      <mc:AlternateContent xmlns:mc="http://schemas.openxmlformats.org/markup-compatibility/2006" xmlns:a14="http://schemas.microsoft.com/office/drawing/2010/main">
+        <mc:Choice Requires="a14">
           <p:sp>
             <p:nvSpPr>
               <p:cNvPr id="5" name="TextBox 4">
@@ -4500,7 +4721,7 @@
             </p:txBody>
           </p:sp>
         </mc:Choice>
-        <mc:Fallback>
+        <mc:Fallback xmlns="">
           <p:sp>
             <p:nvSpPr>
               <p:cNvPr id="5" name="TextBox 4">
@@ -4545,8 +4766,8 @@
           </p:sp>
         </mc:Fallback>
       </mc:AlternateContent>
-      <mc:AlternateContent xmlns:mc="http://schemas.openxmlformats.org/markup-compatibility/2006">
-        <mc:Choice xmlns:a14="http://schemas.microsoft.com/office/drawing/2010/main" Requires="a14">
+      <mc:AlternateContent xmlns:mc="http://schemas.openxmlformats.org/markup-compatibility/2006" xmlns:a14="http://schemas.microsoft.com/office/drawing/2010/main">
+        <mc:Choice Requires="a14">
           <p:sp>
             <p:nvSpPr>
               <p:cNvPr id="6" name="TextBox 5">
@@ -4593,7 +4814,7 @@
             </p:txBody>
           </p:sp>
         </mc:Choice>
-        <mc:Fallback>
+        <mc:Fallback xmlns="">
           <p:sp>
             <p:nvSpPr>
               <p:cNvPr id="6" name="TextBox 5">
@@ -4638,8 +4859,8 @@
           </p:sp>
         </mc:Fallback>
       </mc:AlternateContent>
-      <mc:AlternateContent xmlns:mc="http://schemas.openxmlformats.org/markup-compatibility/2006">
-        <mc:Choice xmlns:a14="http://schemas.microsoft.com/office/drawing/2010/main" Requires="a14">
+      <mc:AlternateContent xmlns:mc="http://schemas.openxmlformats.org/markup-compatibility/2006" xmlns:a14="http://schemas.microsoft.com/office/drawing/2010/main">
+        <mc:Choice Requires="a14">
           <p:sp>
             <p:nvSpPr>
               <p:cNvPr id="7" name="TextBox 6">
@@ -4686,7 +4907,7 @@
             </p:txBody>
           </p:sp>
         </mc:Choice>
-        <mc:Fallback>
+        <mc:Fallback xmlns="">
           <p:sp>
             <p:nvSpPr>
               <p:cNvPr id="7" name="TextBox 6">
@@ -4731,8 +4952,8 @@
           </p:sp>
         </mc:Fallback>
       </mc:AlternateContent>
-      <mc:AlternateContent xmlns:mc="http://schemas.openxmlformats.org/markup-compatibility/2006">
-        <mc:Choice xmlns:a14="http://schemas.microsoft.com/office/drawing/2010/main" Requires="a14">
+      <mc:AlternateContent xmlns:mc="http://schemas.openxmlformats.org/markup-compatibility/2006" xmlns:a14="http://schemas.microsoft.com/office/drawing/2010/main">
+        <mc:Choice Requires="a14">
           <p:sp>
             <p:nvSpPr>
               <p:cNvPr id="8" name="TextBox 7">
@@ -4761,6 +4982,7 @@
               </a:bodyPr>
               <a:lstStyle/>
               <a:p>
+                <a:pPr/>
                 <a14:m>
                   <m:oMathPara xmlns:m="http://schemas.openxmlformats.org/officeDocument/2006/math">
                     <m:oMathParaPr>
@@ -4805,7 +5027,7 @@
             </p:txBody>
           </p:sp>
         </mc:Choice>
-        <mc:Fallback>
+        <mc:Fallback xmlns="">
           <p:sp>
             <p:nvSpPr>
               <p:cNvPr id="8" name="TextBox 7">
@@ -4850,8 +5072,8 @@
           </p:sp>
         </mc:Fallback>
       </mc:AlternateContent>
-      <mc:AlternateContent xmlns:mc="http://schemas.openxmlformats.org/markup-compatibility/2006">
-        <mc:Choice xmlns:a14="http://schemas.microsoft.com/office/drawing/2010/main" Requires="a14">
+      <mc:AlternateContent xmlns:mc="http://schemas.openxmlformats.org/markup-compatibility/2006" xmlns:a14="http://schemas.microsoft.com/office/drawing/2010/main">
+        <mc:Choice Requires="a14">
           <p:sp>
             <p:nvSpPr>
               <p:cNvPr id="9" name="TextBox 8">
@@ -4880,6 +5102,7 @@
               </a:bodyPr>
               <a:lstStyle/>
               <a:p>
+                <a:pPr/>
                 <a14:m>
                   <m:oMathPara xmlns:m="http://schemas.openxmlformats.org/officeDocument/2006/math">
                     <m:oMathParaPr>
@@ -4937,7 +5160,7 @@
             </p:txBody>
           </p:sp>
         </mc:Choice>
-        <mc:Fallback>
+        <mc:Fallback xmlns="">
           <p:sp>
             <p:nvSpPr>
               <p:cNvPr id="9" name="TextBox 8">
@@ -4998,7 +5221,7 @@
             </p:nvSpPr>
             <p:spPr>
               <a:xfrm>
-                <a:off x="1211353" y="2490074"/>
+                <a:off x="1314288" y="2499687"/>
                 <a:ext cx="1189365" cy="369332"/>
               </a:xfrm>
               <a:prstGeom prst="rect">
@@ -5049,7 +5272,7 @@
             </p:nvSpPr>
             <p:spPr>
               <a:xfrm>
-                <a:off x="1211353" y="2490074"/>
+                <a:off x="1314288" y="2499687"/>
                 <a:ext cx="1189365" cy="369332"/>
               </a:xfrm>
               <a:prstGeom prst="rect">
@@ -5113,8 +5336,8 @@
           </a:p>
         </p:txBody>
       </p:sp>
-      <mc:AlternateContent xmlns:mc="http://schemas.openxmlformats.org/markup-compatibility/2006">
-        <mc:Choice xmlns:a14="http://schemas.microsoft.com/office/drawing/2010/main" Requires="a14">
+      <mc:AlternateContent xmlns:mc="http://schemas.openxmlformats.org/markup-compatibility/2006" xmlns:a14="http://schemas.microsoft.com/office/drawing/2010/main">
+        <mc:Choice Requires="a14">
           <p:sp>
             <p:nvSpPr>
               <p:cNvPr id="12" name="Rectangle 11">
@@ -5142,6 +5365,7 @@
               </a:bodyPr>
               <a:lstStyle/>
               <a:p>
+                <a:pPr/>
                 <a14:m>
                   <m:oMathPara xmlns:m="http://schemas.openxmlformats.org/officeDocument/2006/math">
                     <m:oMathParaPr>
@@ -5242,7 +5466,7 @@
             </p:txBody>
           </p:sp>
         </mc:Choice>
-        <mc:Fallback>
+        <mc:Fallback xmlns="">
           <p:sp>
             <p:nvSpPr>
               <p:cNvPr id="12" name="Rectangle 11">
@@ -5287,8 +5511,8 @@
           </p:sp>
         </mc:Fallback>
       </mc:AlternateContent>
-      <mc:AlternateContent xmlns:mc="http://schemas.openxmlformats.org/markup-compatibility/2006">
-        <mc:Choice xmlns:a14="http://schemas.microsoft.com/office/drawing/2010/main" Requires="a14">
+      <mc:AlternateContent xmlns:mc="http://schemas.openxmlformats.org/markup-compatibility/2006" xmlns:a14="http://schemas.microsoft.com/office/drawing/2010/main">
+        <mc:Choice Requires="a14">
           <p:sp>
             <p:nvSpPr>
               <p:cNvPr id="13" name="TextBox 12">
@@ -5317,6 +5541,7 @@
               </a:bodyPr>
               <a:lstStyle/>
               <a:p>
+                <a:pPr/>
                 <a14:m>
                   <m:oMathPara xmlns:m="http://schemas.openxmlformats.org/officeDocument/2006/math">
                     <m:oMathParaPr>
@@ -5355,7 +5580,7 @@
             </p:txBody>
           </p:sp>
         </mc:Choice>
-        <mc:Fallback>
+        <mc:Fallback xmlns="">
           <p:sp>
             <p:nvSpPr>
               <p:cNvPr id="13" name="TextBox 12">
@@ -5400,8 +5625,8 @@
           </p:sp>
         </mc:Fallback>
       </mc:AlternateContent>
-      <mc:AlternateContent xmlns:mc="http://schemas.openxmlformats.org/markup-compatibility/2006">
-        <mc:Choice xmlns:a14="http://schemas.microsoft.com/office/drawing/2010/main" Requires="a14">
+      <mc:AlternateContent xmlns:mc="http://schemas.openxmlformats.org/markup-compatibility/2006" xmlns:a14="http://schemas.microsoft.com/office/drawing/2010/main">
+        <mc:Choice Requires="a14">
           <p:sp>
             <p:nvSpPr>
               <p:cNvPr id="14" name="TextBox 13">
@@ -5430,6 +5655,7 @@
               </a:bodyPr>
               <a:lstStyle/>
               <a:p>
+                <a:pPr/>
                 <a14:m>
                   <m:oMathPara xmlns:m="http://schemas.openxmlformats.org/officeDocument/2006/math">
                     <m:oMathParaPr>
@@ -5531,7 +5757,7 @@
             </p:txBody>
           </p:sp>
         </mc:Choice>
-        <mc:Fallback>
+        <mc:Fallback xmlns="">
           <p:sp>
             <p:nvSpPr>
               <p:cNvPr id="14" name="TextBox 13">
@@ -5576,8 +5802,8 @@
           </p:sp>
         </mc:Fallback>
       </mc:AlternateContent>
-      <mc:AlternateContent xmlns:mc="http://schemas.openxmlformats.org/markup-compatibility/2006">
-        <mc:Choice xmlns:a14="http://schemas.microsoft.com/office/drawing/2010/main" Requires="a14">
+      <mc:AlternateContent xmlns:mc="http://schemas.openxmlformats.org/markup-compatibility/2006" xmlns:a14="http://schemas.microsoft.com/office/drawing/2010/main">
+        <mc:Choice Requires="a14">
           <p:sp>
             <p:nvSpPr>
               <p:cNvPr id="15" name="TextBox 14">
@@ -5606,6 +5832,7 @@
               </a:bodyPr>
               <a:lstStyle/>
               <a:p>
+                <a:pPr/>
                 <a14:m>
                   <m:oMathPara xmlns:m="http://schemas.openxmlformats.org/officeDocument/2006/math">
                     <m:oMathParaPr>
@@ -5644,7 +5871,7 @@
             </p:txBody>
           </p:sp>
         </mc:Choice>
-        <mc:Fallback>
+        <mc:Fallback xmlns="">
           <p:sp>
             <p:nvSpPr>
               <p:cNvPr id="15" name="TextBox 14">
@@ -5689,8 +5916,8 @@
           </p:sp>
         </mc:Fallback>
       </mc:AlternateContent>
-      <mc:AlternateContent xmlns:mc="http://schemas.openxmlformats.org/markup-compatibility/2006">
-        <mc:Choice xmlns:a14="http://schemas.microsoft.com/office/drawing/2010/main" Requires="a14">
+      <mc:AlternateContent xmlns:mc="http://schemas.openxmlformats.org/markup-compatibility/2006" xmlns:a14="http://schemas.microsoft.com/office/drawing/2010/main">
+        <mc:Choice Requires="a14">
           <p:sp>
             <p:nvSpPr>
               <p:cNvPr id="16" name="TextBox 15">
@@ -5737,7 +5964,7 @@
             </p:txBody>
           </p:sp>
         </mc:Choice>
-        <mc:Fallback>
+        <mc:Fallback xmlns="">
           <p:sp>
             <p:nvSpPr>
               <p:cNvPr id="16" name="TextBox 15">
@@ -5782,8 +6009,8 @@
           </p:sp>
         </mc:Fallback>
       </mc:AlternateContent>
-      <mc:AlternateContent xmlns:mc="http://schemas.openxmlformats.org/markup-compatibility/2006">
-        <mc:Choice xmlns:a14="http://schemas.microsoft.com/office/drawing/2010/main" Requires="a14">
+      <mc:AlternateContent xmlns:mc="http://schemas.openxmlformats.org/markup-compatibility/2006" xmlns:a14="http://schemas.microsoft.com/office/drawing/2010/main">
+        <mc:Choice Requires="a14">
           <p:sp>
             <p:nvSpPr>
               <p:cNvPr id="17" name="TextBox 16">
@@ -5812,6 +6039,7 @@
               </a:bodyPr>
               <a:lstStyle/>
               <a:p>
+                <a:pPr/>
                 <a14:m>
                   <m:oMathPara xmlns:m="http://schemas.openxmlformats.org/officeDocument/2006/math">
                     <m:oMathParaPr>
@@ -5894,7 +6122,7 @@
             </p:txBody>
           </p:sp>
         </mc:Choice>
-        <mc:Fallback>
+        <mc:Fallback xmlns="">
           <p:sp>
             <p:nvSpPr>
               <p:cNvPr id="17" name="TextBox 16">
@@ -5939,8 +6167,8 @@
           </p:sp>
         </mc:Fallback>
       </mc:AlternateContent>
-      <mc:AlternateContent xmlns:mc="http://schemas.openxmlformats.org/markup-compatibility/2006">
-        <mc:Choice xmlns:a14="http://schemas.microsoft.com/office/drawing/2010/main" Requires="a14">
+      <mc:AlternateContent xmlns:mc="http://schemas.openxmlformats.org/markup-compatibility/2006" xmlns:a14="http://schemas.microsoft.com/office/drawing/2010/main">
+        <mc:Choice Requires="a14">
           <p:sp>
             <p:nvSpPr>
               <p:cNvPr id="18" name="TextBox 17">
@@ -5989,7 +6217,7 @@
             </p:txBody>
           </p:sp>
         </mc:Choice>
-        <mc:Fallback>
+        <mc:Fallback xmlns="">
           <p:sp>
             <p:nvSpPr>
               <p:cNvPr id="18" name="TextBox 17">
@@ -6034,8 +6262,8 @@
           </p:sp>
         </mc:Fallback>
       </mc:AlternateContent>
-      <mc:AlternateContent xmlns:mc="http://schemas.openxmlformats.org/markup-compatibility/2006">
-        <mc:Choice xmlns:a14="http://schemas.microsoft.com/office/drawing/2010/main" Requires="a14">
+      <mc:AlternateContent xmlns:mc="http://schemas.openxmlformats.org/markup-compatibility/2006" xmlns:a14="http://schemas.microsoft.com/office/drawing/2010/main">
+        <mc:Choice Requires="a14">
           <p:sp>
             <p:nvSpPr>
               <p:cNvPr id="19" name="TextBox 18">
@@ -6064,6 +6292,7 @@
               </a:bodyPr>
               <a:lstStyle/>
               <a:p>
+                <a:pPr/>
                 <a14:m>
                   <m:oMathPara xmlns:m="http://schemas.openxmlformats.org/officeDocument/2006/math">
                     <m:oMathParaPr>
@@ -6281,7 +6510,7 @@
             </p:txBody>
           </p:sp>
         </mc:Choice>
-        <mc:Fallback>
+        <mc:Fallback xmlns="">
           <p:sp>
             <p:nvSpPr>
               <p:cNvPr id="19" name="TextBox 18">
@@ -6326,8 +6555,8 @@
           </p:sp>
         </mc:Fallback>
       </mc:AlternateContent>
-      <mc:AlternateContent xmlns:mc="http://schemas.openxmlformats.org/markup-compatibility/2006">
-        <mc:Choice xmlns:a14="http://schemas.microsoft.com/office/drawing/2010/main" Requires="a14">
+      <mc:AlternateContent xmlns:mc="http://schemas.openxmlformats.org/markup-compatibility/2006" xmlns:a14="http://schemas.microsoft.com/office/drawing/2010/main">
+        <mc:Choice Requires="a14">
           <p:sp>
             <p:nvSpPr>
               <p:cNvPr id="20" name="TextBox 19">
@@ -6356,6 +6585,7 @@
               </a:bodyPr>
               <a:lstStyle/>
               <a:p>
+                <a:pPr/>
                 <a14:m>
                   <m:oMathPara xmlns:m="http://schemas.openxmlformats.org/officeDocument/2006/math">
                     <m:oMathParaPr>
@@ -6494,7 +6724,7 @@
             </p:txBody>
           </p:sp>
         </mc:Choice>
-        <mc:Fallback>
+        <mc:Fallback xmlns="">
           <p:sp>
             <p:nvSpPr>
               <p:cNvPr id="20" name="TextBox 19">
@@ -6539,8 +6769,8 @@
           </p:sp>
         </mc:Fallback>
       </mc:AlternateContent>
-      <mc:AlternateContent xmlns:mc="http://schemas.openxmlformats.org/markup-compatibility/2006">
-        <mc:Choice xmlns:a14="http://schemas.microsoft.com/office/drawing/2010/main" Requires="a14">
+      <mc:AlternateContent xmlns:mc="http://schemas.openxmlformats.org/markup-compatibility/2006" xmlns:a14="http://schemas.microsoft.com/office/drawing/2010/main">
+        <mc:Choice Requires="a14">
           <p:sp>
             <p:nvSpPr>
               <p:cNvPr id="21" name="TextBox 20">
@@ -6606,7 +6836,7 @@
             </p:txBody>
           </p:sp>
         </mc:Choice>
-        <mc:Fallback>
+        <mc:Fallback xmlns="">
           <p:sp>
             <p:nvSpPr>
               <p:cNvPr id="21" name="TextBox 20">
@@ -6651,8 +6881,8 @@
           </p:sp>
         </mc:Fallback>
       </mc:AlternateContent>
-      <mc:AlternateContent xmlns:mc="http://schemas.openxmlformats.org/markup-compatibility/2006">
-        <mc:Choice xmlns:a14="http://schemas.microsoft.com/office/drawing/2010/main" Requires="a14">
+      <mc:AlternateContent xmlns:mc="http://schemas.openxmlformats.org/markup-compatibility/2006" xmlns:a14="http://schemas.microsoft.com/office/drawing/2010/main">
+        <mc:Choice Requires="a14">
           <p:sp>
             <p:nvSpPr>
               <p:cNvPr id="22" name="TextBox 21">
@@ -6718,7 +6948,7 @@
             </p:txBody>
           </p:sp>
         </mc:Choice>
-        <mc:Fallback>
+        <mc:Fallback xmlns="">
           <p:sp>
             <p:nvSpPr>
               <p:cNvPr id="22" name="TextBox 21">
@@ -6763,8 +6993,8 @@
           </p:sp>
         </mc:Fallback>
       </mc:AlternateContent>
-      <mc:AlternateContent xmlns:mc="http://schemas.openxmlformats.org/markup-compatibility/2006">
-        <mc:Choice xmlns:a14="http://schemas.microsoft.com/office/drawing/2010/main" Requires="a14">
+      <mc:AlternateContent xmlns:mc="http://schemas.openxmlformats.org/markup-compatibility/2006" xmlns:a14="http://schemas.microsoft.com/office/drawing/2010/main">
+        <mc:Choice Requires="a14">
           <p:sp>
             <p:nvSpPr>
               <p:cNvPr id="23" name="TextBox 22">
@@ -6830,7 +7060,7 @@
             </p:txBody>
           </p:sp>
         </mc:Choice>
-        <mc:Fallback>
+        <mc:Fallback xmlns="">
           <p:sp>
             <p:nvSpPr>
               <p:cNvPr id="23" name="TextBox 22">
@@ -6875,8 +7105,8 @@
           </p:sp>
         </mc:Fallback>
       </mc:AlternateContent>
-      <mc:AlternateContent xmlns:mc="http://schemas.openxmlformats.org/markup-compatibility/2006">
-        <mc:Choice xmlns:a14="http://schemas.microsoft.com/office/drawing/2010/main" Requires="a14">
+      <mc:AlternateContent xmlns:mc="http://schemas.openxmlformats.org/markup-compatibility/2006" xmlns:a14="http://schemas.microsoft.com/office/drawing/2010/main">
+        <mc:Choice Requires="a14">
           <p:sp>
             <p:nvSpPr>
               <p:cNvPr id="24" name="TextBox 23">
@@ -6905,6 +7135,7 @@
               </a:bodyPr>
               <a:lstStyle/>
               <a:p>
+                <a:pPr/>
                 <a14:m>
                   <m:oMathPara xmlns:m="http://schemas.openxmlformats.org/officeDocument/2006/math">
                     <m:oMathParaPr>
@@ -7148,7 +7379,7 @@
             </p:txBody>
           </p:sp>
         </mc:Choice>
-        <mc:Fallback>
+        <mc:Fallback xmlns="">
           <p:sp>
             <p:nvSpPr>
               <p:cNvPr id="24" name="TextBox 23">
@@ -7197,6 +7428,204 @@
     <p:extLst>
       <p:ext uri="{BB962C8B-B14F-4D97-AF65-F5344CB8AC3E}">
         <p14:creationId xmlns:p14="http://schemas.microsoft.com/office/powerpoint/2010/main" val="2862359531"/>
+      </p:ext>
+    </p:extLst>
+  </p:cSld>
+  <p:clrMapOvr>
+    <a:masterClrMapping/>
+  </p:clrMapOvr>
+</p:sld>
+</file>
+
+<file path=ppt/slides/slide13.xml><?xml version="1.0" encoding="utf-8"?>
+<p:sld xmlns:a="http://schemas.openxmlformats.org/drawingml/2006/main" xmlns:r="http://schemas.openxmlformats.org/officeDocument/2006/relationships" xmlns:p="http://schemas.openxmlformats.org/presentationml/2006/main">
+  <p:cSld>
+    <p:spTree>
+      <p:nvGrpSpPr>
+        <p:cNvPr id="1" name=""/>
+        <p:cNvGrpSpPr/>
+        <p:nvPr/>
+      </p:nvGrpSpPr>
+      <p:grpSpPr>
+        <a:xfrm>
+          <a:off x="0" y="0"/>
+          <a:ext cx="0" cy="0"/>
+          <a:chOff x="0" y="0"/>
+          <a:chExt cx="0" cy="0"/>
+        </a:xfrm>
+      </p:grpSpPr>
+      <p:sp>
+        <p:nvSpPr>
+          <p:cNvPr id="2" name="Title 1">
+            <a:extLst>
+              <a:ext uri="{FF2B5EF4-FFF2-40B4-BE49-F238E27FC236}">
+                <a16:creationId xmlns:a16="http://schemas.microsoft.com/office/drawing/2014/main" id="{BC358050-A6E6-1948-A025-7F9BD4FCDD9E}"/>
+              </a:ext>
+            </a:extLst>
+          </p:cNvPr>
+          <p:cNvSpPr>
+            <a:spLocks noGrp="1"/>
+          </p:cNvSpPr>
+          <p:nvPr>
+            <p:ph type="title"/>
+          </p:nvPr>
+        </p:nvSpPr>
+        <p:spPr/>
+        <p:txBody>
+          <a:bodyPr/>
+          <a:lstStyle/>
+          <a:p>
+            <a:r>
+              <a:rPr lang="en-US" dirty="0"/>
+              <a:t>Update – share scaling</a:t>
+            </a:r>
+          </a:p>
+        </p:txBody>
+      </p:sp>
+      <p:pic>
+        <p:nvPicPr>
+          <p:cNvPr id="7" name="Picture 6">
+            <a:extLst>
+              <a:ext uri="{FF2B5EF4-FFF2-40B4-BE49-F238E27FC236}">
+                <a16:creationId xmlns:a16="http://schemas.microsoft.com/office/drawing/2014/main" id="{381AB7BF-C7BD-7745-8746-191B5F286F6F}"/>
+              </a:ext>
+            </a:extLst>
+          </p:cNvPr>
+          <p:cNvPicPr>
+            <a:picLocks noChangeAspect="1"/>
+          </p:cNvPicPr>
+          <p:nvPr/>
+        </p:nvPicPr>
+        <p:blipFill>
+          <a:blip r:embed="rId2"/>
+          <a:stretch>
+            <a:fillRect/>
+          </a:stretch>
+        </p:blipFill>
+        <p:spPr>
+          <a:xfrm>
+            <a:off x="0" y="1571501"/>
+            <a:ext cx="12192000" cy="3742708"/>
+          </a:xfrm>
+          <a:prstGeom prst="rect">
+            <a:avLst/>
+          </a:prstGeom>
+        </p:spPr>
+      </p:pic>
+      <p:sp>
+        <p:nvSpPr>
+          <p:cNvPr id="8" name="TextBox 7">
+            <a:extLst>
+              <a:ext uri="{FF2B5EF4-FFF2-40B4-BE49-F238E27FC236}">
+                <a16:creationId xmlns:a16="http://schemas.microsoft.com/office/drawing/2014/main" id="{E18051E1-B32A-FF42-8018-BE7341AB812F}"/>
+              </a:ext>
+            </a:extLst>
+          </p:cNvPr>
+          <p:cNvSpPr txBox="1"/>
+          <p:nvPr/>
+        </p:nvSpPr>
+        <p:spPr>
+          <a:xfrm>
+            <a:off x="838200" y="2189018"/>
+            <a:ext cx="2127890" cy="369332"/>
+          </a:xfrm>
+          <a:prstGeom prst="rect">
+            <a:avLst/>
+          </a:prstGeom>
+          <a:noFill/>
+        </p:spPr>
+        <p:txBody>
+          <a:bodyPr wrap="none" rtlCol="0">
+            <a:spAutoFit/>
+          </a:bodyPr>
+          <a:lstStyle/>
+          <a:p>
+            <a:r>
+              <a:rPr lang="en-US" dirty="0"/>
+              <a:t>Only use </a:t>
+            </a:r>
+            <a:r>
+              <a:rPr lang="en-US" dirty="0" err="1"/>
+              <a:t>detID</a:t>
+            </a:r>
+            <a:r>
+              <a:rPr lang="en-US" dirty="0"/>
+              <a:t> = 2, 8</a:t>
+            </a:r>
+          </a:p>
+        </p:txBody>
+      </p:sp>
+      <p:sp>
+        <p:nvSpPr>
+          <p:cNvPr id="9" name="TextBox 8">
+            <a:extLst>
+              <a:ext uri="{FF2B5EF4-FFF2-40B4-BE49-F238E27FC236}">
+                <a16:creationId xmlns:a16="http://schemas.microsoft.com/office/drawing/2014/main" id="{734C956C-F7CC-9749-80CB-17F1A9B834DC}"/>
+              </a:ext>
+            </a:extLst>
+          </p:cNvPr>
+          <p:cNvSpPr txBox="1"/>
+          <p:nvPr/>
+        </p:nvSpPr>
+        <p:spPr>
+          <a:xfrm>
+            <a:off x="3297382" y="5583382"/>
+            <a:ext cx="3680688" cy="369332"/>
+          </a:xfrm>
+          <a:prstGeom prst="rect">
+            <a:avLst/>
+          </a:prstGeom>
+          <a:noFill/>
+        </p:spPr>
+        <p:txBody>
+          <a:bodyPr wrap="none" rtlCol="0">
+            <a:spAutoFit/>
+          </a:bodyPr>
+          <a:lstStyle/>
+          <a:p>
+            <a:r>
+              <a:rPr lang="en-US" dirty="0"/>
+              <a:t>Run for 14 min for 60 trial. 781 used. </a:t>
+            </a:r>
+          </a:p>
+        </p:txBody>
+      </p:sp>
+      <p:sp>
+        <p:nvSpPr>
+          <p:cNvPr id="10" name="TextBox 9">
+            <a:extLst>
+              <a:ext uri="{FF2B5EF4-FFF2-40B4-BE49-F238E27FC236}">
+                <a16:creationId xmlns:a16="http://schemas.microsoft.com/office/drawing/2014/main" id="{CB0D6F1E-4D01-3943-93D4-E7FD5C38F4DF}"/>
+              </a:ext>
+            </a:extLst>
+          </p:cNvPr>
+          <p:cNvSpPr txBox="1"/>
+          <p:nvPr/>
+        </p:nvSpPr>
+        <p:spPr>
+          <a:xfrm>
+            <a:off x="7620000" y="5624945"/>
+            <a:ext cx="184731" cy="369332"/>
+          </a:xfrm>
+          <a:prstGeom prst="rect">
+            <a:avLst/>
+          </a:prstGeom>
+          <a:noFill/>
+        </p:spPr>
+        <p:txBody>
+          <a:bodyPr wrap="none" rtlCol="0">
+            <a:spAutoFit/>
+          </a:bodyPr>
+          <a:lstStyle/>
+          <a:p>
+            <a:endParaRPr lang="en-US"/>
+          </a:p>
+        </p:txBody>
+      </p:sp>
+    </p:spTree>
+    <p:extLst>
+      <p:ext uri="{BB962C8B-B14F-4D97-AF65-F5344CB8AC3E}">
+        <p14:creationId xmlns:p14="http://schemas.microsoft.com/office/powerpoint/2010/main" val="4102673620"/>
       </p:ext>
     </p:extLst>
   </p:cSld>
@@ -8296,7 +8725,7 @@
             </a:r>
             <a:r>
               <a:rPr lang="en-US" dirty="0"/>
-              <a:t>), so that 𝚺D is minimum.</a:t>
+              <a:t>), so that          is minimum.</a:t>
             </a:r>
           </a:p>
           <a:p>
@@ -8465,8 +8894,8 @@
           </a:fontRef>
         </p:style>
       </p:cxnSp>
-      <mc:AlternateContent xmlns:mc="http://schemas.openxmlformats.org/markup-compatibility/2006">
-        <mc:Choice xmlns:a14="http://schemas.microsoft.com/office/drawing/2010/main" Requires="a14">
+      <mc:AlternateContent xmlns:mc="http://schemas.openxmlformats.org/markup-compatibility/2006" xmlns:a14="http://schemas.microsoft.com/office/drawing/2010/main">
+        <mc:Choice Requires="a14">
           <p:sp>
             <p:nvSpPr>
               <p:cNvPr id="14" name="TextBox 13">
@@ -8619,7 +9048,7 @@
             </p:txBody>
           </p:sp>
         </mc:Choice>
-        <mc:Fallback>
+        <mc:Fallback xmlns="">
           <p:sp>
             <p:nvSpPr>
               <p:cNvPr id="14" name="TextBox 13">
@@ -8669,8 +9098,8 @@
           </p:sp>
         </mc:Fallback>
       </mc:AlternateContent>
-      <mc:AlternateContent xmlns:mc="http://schemas.openxmlformats.org/markup-compatibility/2006">
-        <mc:Choice xmlns:a14="http://schemas.microsoft.com/office/drawing/2010/main" Requires="a14">
+      <mc:AlternateContent xmlns:mc="http://schemas.openxmlformats.org/markup-compatibility/2006" xmlns:a14="http://schemas.microsoft.com/office/drawing/2010/main">
+        <mc:Choice Requires="a14">
           <p:sp>
             <p:nvSpPr>
               <p:cNvPr id="16" name="TextBox 15">
@@ -8699,6 +9128,7 @@
               </a:bodyPr>
               <a:lstStyle/>
               <a:p>
+                <a:pPr/>
                 <a14:m>
                   <m:oMathPara xmlns:m="http://schemas.openxmlformats.org/officeDocument/2006/math">
                     <m:oMathParaPr>
@@ -8818,7 +9248,7 @@
             </p:txBody>
           </p:sp>
         </mc:Choice>
-        <mc:Fallback>
+        <mc:Fallback xmlns="">
           <p:sp>
             <p:nvSpPr>
               <p:cNvPr id="16" name="TextBox 15">
@@ -8863,8 +9293,8 @@
           </p:sp>
         </mc:Fallback>
       </mc:AlternateContent>
-      <mc:AlternateContent xmlns:mc="http://schemas.openxmlformats.org/markup-compatibility/2006">
-        <mc:Choice xmlns:a14="http://schemas.microsoft.com/office/drawing/2010/main" Requires="a14">
+      <mc:AlternateContent xmlns:mc="http://schemas.openxmlformats.org/markup-compatibility/2006" xmlns:a14="http://schemas.microsoft.com/office/drawing/2010/main">
+        <mc:Choice Requires="a14">
           <p:sp>
             <p:nvSpPr>
               <p:cNvPr id="17" name="TextBox 16">
@@ -8893,6 +9323,7 @@
               </a:bodyPr>
               <a:lstStyle/>
               <a:p>
+                <a:pPr/>
                 <a14:m>
                   <m:oMathPara xmlns:m="http://schemas.openxmlformats.org/officeDocument/2006/math">
                     <m:oMathParaPr>
@@ -9126,7 +9557,7 @@
             </p:txBody>
           </p:sp>
         </mc:Choice>
-        <mc:Fallback>
+        <mc:Fallback xmlns="">
           <p:sp>
             <p:nvSpPr>
               <p:cNvPr id="17" name="TextBox 16">
@@ -9171,8 +9602,8 @@
           </p:sp>
         </mc:Fallback>
       </mc:AlternateContent>
-      <mc:AlternateContent xmlns:mc="http://schemas.openxmlformats.org/markup-compatibility/2006">
-        <mc:Choice xmlns:a14="http://schemas.microsoft.com/office/drawing/2010/main" Requires="a14">
+      <mc:AlternateContent xmlns:mc="http://schemas.openxmlformats.org/markup-compatibility/2006" xmlns:a14="http://schemas.microsoft.com/office/drawing/2010/main">
+        <mc:Choice Requires="a14">
           <p:sp>
             <p:nvSpPr>
               <p:cNvPr id="18" name="TextBox 17">
@@ -9201,6 +9632,7 @@
               </a:bodyPr>
               <a:lstStyle/>
               <a:p>
+                <a:pPr/>
                 <a14:m>
                   <m:oMathPara xmlns:m="http://schemas.openxmlformats.org/officeDocument/2006/math">
                     <m:oMathParaPr>
@@ -9331,7 +9763,7 @@
             </p:txBody>
           </p:sp>
         </mc:Choice>
-        <mc:Fallback>
+        <mc:Fallback xmlns="">
           <p:sp>
             <p:nvSpPr>
               <p:cNvPr id="18" name="TextBox 17">
@@ -9376,8 +9808,8 @@
           </p:sp>
         </mc:Fallback>
       </mc:AlternateContent>
-      <mc:AlternateContent xmlns:mc="http://schemas.openxmlformats.org/markup-compatibility/2006">
-        <mc:Choice xmlns:a14="http://schemas.microsoft.com/office/drawing/2010/main" Requires="a14">
+      <mc:AlternateContent xmlns:mc="http://schemas.openxmlformats.org/markup-compatibility/2006" xmlns:a14="http://schemas.microsoft.com/office/drawing/2010/main">
+        <mc:Choice Requires="a14">
           <p:sp>
             <p:nvSpPr>
               <p:cNvPr id="19" name="TextBox 18">
@@ -9406,6 +9838,7 @@
               </a:bodyPr>
               <a:lstStyle/>
               <a:p>
+                <a:pPr/>
                 <a14:m>
                   <m:oMathPara xmlns:m="http://schemas.openxmlformats.org/officeDocument/2006/math">
                     <m:oMathParaPr>
@@ -9583,7 +10016,7 @@
             </p:txBody>
           </p:sp>
         </mc:Choice>
-        <mc:Fallback>
+        <mc:Fallback xmlns="">
           <p:sp>
             <p:nvSpPr>
               <p:cNvPr id="19" name="TextBox 18">
@@ -9628,8 +10061,8 @@
           </p:sp>
         </mc:Fallback>
       </mc:AlternateContent>
-      <mc:AlternateContent xmlns:mc="http://schemas.openxmlformats.org/markup-compatibility/2006">
-        <mc:Choice xmlns:a14="http://schemas.microsoft.com/office/drawing/2010/main" Requires="a14">
+      <mc:AlternateContent xmlns:mc="http://schemas.openxmlformats.org/markup-compatibility/2006" xmlns:a14="http://schemas.microsoft.com/office/drawing/2010/main">
+        <mc:Choice Requires="a14">
           <p:sp>
             <p:nvSpPr>
               <p:cNvPr id="20" name="Rectangle 19">
@@ -9657,6 +10090,7 @@
               </a:bodyPr>
               <a:lstStyle/>
               <a:p>
+                <a:pPr/>
                 <a14:m>
                   <m:oMathPara xmlns:m="http://schemas.openxmlformats.org/officeDocument/2006/math">
                     <m:oMathParaPr>
@@ -9789,7 +10223,7 @@
             </p:txBody>
           </p:sp>
         </mc:Choice>
-        <mc:Fallback>
+        <mc:Fallback xmlns="">
           <p:sp>
             <p:nvSpPr>
               <p:cNvPr id="20" name="Rectangle 19">
@@ -9834,8 +10268,8 @@
           </p:sp>
         </mc:Fallback>
       </mc:AlternateContent>
-      <mc:AlternateContent xmlns:mc="http://schemas.openxmlformats.org/markup-compatibility/2006">
-        <mc:Choice xmlns:a14="http://schemas.microsoft.com/office/drawing/2010/main" Requires="a14">
+      <mc:AlternateContent xmlns:mc="http://schemas.openxmlformats.org/markup-compatibility/2006" xmlns:a14="http://schemas.microsoft.com/office/drawing/2010/main">
+        <mc:Choice Requires="a14">
           <p:sp>
             <p:nvSpPr>
               <p:cNvPr id="21" name="Rectangle 20">
@@ -9863,6 +10297,127 @@
               </a:bodyPr>
               <a:lstStyle/>
               <a:p>
+                <a:pPr/>
+                <a14:m>
+                  <m:oMathPara xmlns:m="http://schemas.openxmlformats.org/officeDocument/2006/math">
+                    <m:oMathParaPr>
+                      <m:jc m:val="centerGroup"/>
+                    </m:oMathParaPr>
+                    <m:oMath xmlns:m="http://schemas.openxmlformats.org/officeDocument/2006/math">
+                      <m:r>
+                        <a:rPr lang="en-US" sz="2400" b="0" i="1" smtClean="0">
+                          <a:latin typeface="Cambria Math" panose="02040503050406030204" pitchFamily="18" charset="0"/>
+                        </a:rPr>
+                        <m:t>∑</m:t>
+                      </m:r>
+                      <m:sSub>
+                        <m:sSubPr>
+                          <m:ctrlPr>
+                            <a:rPr lang="en-US" sz="2400" b="0" i="1" smtClean="0">
+                              <a:latin typeface="Cambria Math" panose="02040503050406030204" pitchFamily="18" charset="0"/>
+                            </a:rPr>
+                          </m:ctrlPr>
+                        </m:sSubPr>
+                        <m:e>
+                          <m:r>
+                            <a:rPr lang="en-US" sz="2400" b="0" i="1" smtClean="0">
+                              <a:latin typeface="Cambria Math" panose="02040503050406030204" pitchFamily="18" charset="0"/>
+                            </a:rPr>
+                            <m:t>𝐷</m:t>
+                          </m:r>
+                        </m:e>
+                        <m:sub>
+                          <m:r>
+                            <a:rPr lang="en-US" sz="2400" b="0" i="1" smtClean="0">
+                              <a:latin typeface="Cambria Math" panose="02040503050406030204" pitchFamily="18" charset="0"/>
+                            </a:rPr>
+                            <m:t>𝑖</m:t>
+                          </m:r>
+                        </m:sub>
+                      </m:sSub>
+                    </m:oMath>
+                  </m:oMathPara>
+                </a14:m>
+                <a:endParaRPr lang="en-US" sz="2400" dirty="0"/>
+              </a:p>
+            </p:txBody>
+          </p:sp>
+        </mc:Choice>
+        <mc:Fallback xmlns="">
+          <p:sp>
+            <p:nvSpPr>
+              <p:cNvPr id="21" name="Rectangle 20">
+                <a:extLst>
+                  <a:ext uri="{FF2B5EF4-FFF2-40B4-BE49-F238E27FC236}">
+                    <a16:creationId xmlns:a16="http://schemas.microsoft.com/office/drawing/2014/main" id="{D899005F-9A7B-E044-9D5A-3B0B689962FA}"/>
+                  </a:ext>
+                </a:extLst>
+              </p:cNvPr>
+              <p:cNvSpPr>
+                <a:spLocks noRot="1" noChangeAspect="1" noMove="1" noResize="1" noEditPoints="1" noAdjustHandles="1" noChangeArrowheads="1" noChangeShapeType="1" noTextEdit="1"/>
+              </p:cNvSpPr>
+              <p:nvPr/>
+            </p:nvSpPr>
+            <p:spPr>
+              <a:xfrm>
+                <a:off x="2221621" y="3829755"/>
+                <a:ext cx="765787" cy="461665"/>
+              </a:xfrm>
+              <a:prstGeom prst="rect">
+                <a:avLst/>
+              </a:prstGeom>
+              <a:blipFill>
+                <a:blip r:embed="rId8"/>
+                <a:stretch>
+                  <a:fillRect l="-1639" b="-16216"/>
+                </a:stretch>
+              </a:blipFill>
+            </p:spPr>
+            <p:txBody>
+              <a:bodyPr/>
+              <a:lstStyle/>
+              <a:p>
+                <a:r>
+                  <a:rPr lang="en-US">
+                    <a:noFill/>
+                  </a:rPr>
+                  <a:t> </a:t>
+                </a:r>
+              </a:p>
+            </p:txBody>
+          </p:sp>
+        </mc:Fallback>
+      </mc:AlternateContent>
+      <mc:AlternateContent xmlns:mc="http://schemas.openxmlformats.org/markup-compatibility/2006">
+        <mc:Choice xmlns:a14="http://schemas.microsoft.com/office/drawing/2010/main" Requires="a14">
+          <p:sp>
+            <p:nvSpPr>
+              <p:cNvPr id="15" name="Rectangle 14">
+                <a:extLst>
+                  <a:ext uri="{FF2B5EF4-FFF2-40B4-BE49-F238E27FC236}">
+                    <a16:creationId xmlns:a16="http://schemas.microsoft.com/office/drawing/2014/main" id="{3A206B32-E1AD-F045-8836-412E49AD5A7E}"/>
+                  </a:ext>
+                </a:extLst>
+              </p:cNvPr>
+              <p:cNvSpPr/>
+              <p:nvPr/>
+            </p:nvSpPr>
+            <p:spPr>
+              <a:xfrm>
+                <a:off x="4334525" y="4351013"/>
+                <a:ext cx="765787" cy="461665"/>
+              </a:xfrm>
+              <a:prstGeom prst="rect">
+                <a:avLst/>
+              </a:prstGeom>
+            </p:spPr>
+            <p:txBody>
+              <a:bodyPr wrap="none">
+                <a:spAutoFit/>
+              </a:bodyPr>
+              <a:lstStyle/>
+              <a:p>
+                <a:pPr/>
                 <a14:m>
                   <m:oMathPara xmlns:m="http://schemas.openxmlformats.org/officeDocument/2006/math">
                     <m:oMathParaPr>
@@ -9911,10 +10466,10 @@
         <mc:Fallback>
           <p:sp>
             <p:nvSpPr>
-              <p:cNvPr id="21" name="Rectangle 20">
+              <p:cNvPr id="15" name="Rectangle 14">
                 <a:extLst>
                   <a:ext uri="{FF2B5EF4-FFF2-40B4-BE49-F238E27FC236}">
-                    <a16:creationId xmlns:a16="http://schemas.microsoft.com/office/drawing/2014/main" id="{D899005F-9A7B-E044-9D5A-3B0B689962FA}"/>
+                    <a16:creationId xmlns:a16="http://schemas.microsoft.com/office/drawing/2014/main" id="{3A206B32-E1AD-F045-8836-412E49AD5A7E}"/>
                   </a:ext>
                 </a:extLst>
               </p:cNvPr>
@@ -9925,16 +10480,16 @@
             </p:nvSpPr>
             <p:spPr>
               <a:xfrm>
-                <a:off x="2221621" y="3829755"/>
+                <a:off x="4334525" y="4351013"/>
                 <a:ext cx="765787" cy="461665"/>
               </a:xfrm>
               <a:prstGeom prst="rect">
                 <a:avLst/>
               </a:prstGeom>
               <a:blipFill>
-                <a:blip r:embed="rId8"/>
+                <a:blip r:embed="rId9"/>
                 <a:stretch>
-                  <a:fillRect l="-1639" b="-16216"/>
+                  <a:fillRect b="-16216"/>
                 </a:stretch>
               </a:blipFill>
             </p:spPr>
@@ -11104,7 +11659,7 @@
         </p:nvSpPr>
         <p:spPr>
           <a:xfrm>
-            <a:off x="7060557" y="289367"/>
+            <a:off x="6991284" y="160530"/>
             <a:ext cx="3258584" cy="369332"/>
           </a:xfrm>
           <a:prstGeom prst="rect">
@@ -11127,6 +11682,41 @@
               <a:t>keV</a:t>
             </a:r>
             <a:endParaRPr lang="en-US" dirty="0"/>
+          </a:p>
+        </p:txBody>
+      </p:sp>
+      <p:sp>
+        <p:nvSpPr>
+          <p:cNvPr id="2" name="TextBox 1">
+            <a:extLst>
+              <a:ext uri="{FF2B5EF4-FFF2-40B4-BE49-F238E27FC236}">
+                <a16:creationId xmlns:a16="http://schemas.microsoft.com/office/drawing/2014/main" id="{4CAD6563-8203-6A4F-9DAE-867CD8B33479}"/>
+              </a:ext>
+            </a:extLst>
+          </p:cNvPr>
+          <p:cNvSpPr txBox="1"/>
+          <p:nvPr/>
+        </p:nvSpPr>
+        <p:spPr>
+          <a:xfrm>
+            <a:off x="7098103" y="1316618"/>
+            <a:ext cx="1387175" cy="369332"/>
+          </a:xfrm>
+          <a:prstGeom prst="rect">
+            <a:avLst/>
+          </a:prstGeom>
+          <a:noFill/>
+        </p:spPr>
+        <p:txBody>
+          <a:bodyPr wrap="none" rtlCol="0">
+            <a:spAutoFit/>
+          </a:bodyPr>
+          <a:lstStyle/>
+          <a:p>
+            <a:r>
+              <a:rPr lang="en-US" dirty="0"/>
+              <a:t>Not accurate</a:t>
+            </a:r>
           </a:p>
         </p:txBody>
       </p:sp>

</xml_diff>